<commit_message>
updated figure1 and 3
</commit_message>
<xml_diff>
--- a/figure-assembly/sup-figure-1.pptx
+++ b/figure-assembly/sup-figure-1.pptx
@@ -2973,6 +2973,36 @@
       </p:grpSpPr>
       <p:pic>
         <p:nvPicPr>
+          <p:cNvPr id="15" name="Picture 14">
+            <a:extLst>
+              <a:ext uri="{FF2B5EF4-FFF2-40B4-BE49-F238E27FC236}">
+                <a16:creationId xmlns:a16="http://schemas.microsoft.com/office/drawing/2014/main" id="{BE74302C-7EBA-2E40-A1AA-0F9A4242535C}"/>
+              </a:ext>
+            </a:extLst>
+          </p:cNvPr>
+          <p:cNvPicPr>
+            <a:picLocks noChangeAspect="1"/>
+          </p:cNvPicPr>
+          <p:nvPr/>
+        </p:nvPicPr>
+        <p:blipFill>
+          <a:blip r:embed="rId2"/>
+          <a:stretch>
+            <a:fillRect/>
+          </a:stretch>
+        </p:blipFill>
+        <p:spPr>
+          <a:xfrm>
+            <a:off x="747346" y="6188457"/>
+            <a:ext cx="8654582" cy="2088471"/>
+          </a:xfrm>
+          <a:prstGeom prst="rect">
+            <a:avLst/>
+          </a:prstGeom>
+        </p:spPr>
+      </p:pic>
+      <p:pic>
+        <p:nvPicPr>
           <p:cNvPr id="7" name="Picture 6">
             <a:extLst>
               <a:ext uri="{FF2B5EF4-FFF2-40B4-BE49-F238E27FC236}">
@@ -2986,7 +3016,7 @@
           <p:nvPr/>
         </p:nvPicPr>
         <p:blipFill>
-          <a:blip r:embed="rId2"/>
+          <a:blip r:embed="rId3"/>
           <a:stretch>
             <a:fillRect/>
           </a:stretch>
@@ -3016,7 +3046,7 @@
           <p:nvPr/>
         </p:nvPicPr>
         <p:blipFill>
-          <a:blip r:embed="rId3"/>
+          <a:blip r:embed="rId4"/>
           <a:stretch>
             <a:fillRect/>
           </a:stretch>
@@ -3081,7 +3111,7 @@
         </p:nvSpPr>
         <p:spPr>
           <a:xfrm>
-            <a:off x="236001" y="5857495"/>
+            <a:off x="236001" y="5928746"/>
             <a:ext cx="653849" cy="447943"/>
           </a:xfrm>
           <a:prstGeom prst="rect">

</xml_diff>

<commit_message>
changed yscale C-left sup fig 1
</commit_message>
<xml_diff>
--- a/figure-assembly/sup-figure-1.pptx
+++ b/figure-assembly/sup-figure-1.pptx
@@ -243,7 +243,7 @@
           <a:p>
             <a:fld id="{25EC0CD3-564D-9742-98B5-86271438CCE6}" type="datetimeFigureOut">
               <a:rPr lang="en-US" smtClean="0"/>
-              <a:t>11/11/18</a:t>
+              <a:t>11/19/18</a:t>
             </a:fld>
             <a:endParaRPr lang="en-US"/>
           </a:p>
@@ -413,7 +413,7 @@
           <a:p>
             <a:fld id="{25EC0CD3-564D-9742-98B5-86271438CCE6}" type="datetimeFigureOut">
               <a:rPr lang="en-US" smtClean="0"/>
-              <a:t>11/11/18</a:t>
+              <a:t>11/19/18</a:t>
             </a:fld>
             <a:endParaRPr lang="en-US"/>
           </a:p>
@@ -593,7 +593,7 @@
           <a:p>
             <a:fld id="{25EC0CD3-564D-9742-98B5-86271438CCE6}" type="datetimeFigureOut">
               <a:rPr lang="en-US" smtClean="0"/>
-              <a:t>11/11/18</a:t>
+              <a:t>11/19/18</a:t>
             </a:fld>
             <a:endParaRPr lang="en-US"/>
           </a:p>
@@ -763,7 +763,7 @@
           <a:p>
             <a:fld id="{25EC0CD3-564D-9742-98B5-86271438CCE6}" type="datetimeFigureOut">
               <a:rPr lang="en-US" smtClean="0"/>
-              <a:t>11/11/18</a:t>
+              <a:t>11/19/18</a:t>
             </a:fld>
             <a:endParaRPr lang="en-US"/>
           </a:p>
@@ -1007,7 +1007,7 @@
           <a:p>
             <a:fld id="{25EC0CD3-564D-9742-98B5-86271438CCE6}" type="datetimeFigureOut">
               <a:rPr lang="en-US" smtClean="0"/>
-              <a:t>11/11/18</a:t>
+              <a:t>11/19/18</a:t>
             </a:fld>
             <a:endParaRPr lang="en-US"/>
           </a:p>
@@ -1239,7 +1239,7 @@
           <a:p>
             <a:fld id="{25EC0CD3-564D-9742-98B5-86271438CCE6}" type="datetimeFigureOut">
               <a:rPr lang="en-US" smtClean="0"/>
-              <a:t>11/11/18</a:t>
+              <a:t>11/19/18</a:t>
             </a:fld>
             <a:endParaRPr lang="en-US"/>
           </a:p>
@@ -1606,7 +1606,7 @@
           <a:p>
             <a:fld id="{25EC0CD3-564D-9742-98B5-86271438CCE6}" type="datetimeFigureOut">
               <a:rPr lang="en-US" smtClean="0"/>
-              <a:t>11/11/18</a:t>
+              <a:t>11/19/18</a:t>
             </a:fld>
             <a:endParaRPr lang="en-US"/>
           </a:p>
@@ -1724,7 +1724,7 @@
           <a:p>
             <a:fld id="{25EC0CD3-564D-9742-98B5-86271438CCE6}" type="datetimeFigureOut">
               <a:rPr lang="en-US" smtClean="0"/>
-              <a:t>11/11/18</a:t>
+              <a:t>11/19/18</a:t>
             </a:fld>
             <a:endParaRPr lang="en-US"/>
           </a:p>
@@ -1819,7 +1819,7 @@
           <a:p>
             <a:fld id="{25EC0CD3-564D-9742-98B5-86271438CCE6}" type="datetimeFigureOut">
               <a:rPr lang="en-US" smtClean="0"/>
-              <a:t>11/11/18</a:t>
+              <a:t>11/19/18</a:t>
             </a:fld>
             <a:endParaRPr lang="en-US"/>
           </a:p>
@@ -2096,7 +2096,7 @@
           <a:p>
             <a:fld id="{25EC0CD3-564D-9742-98B5-86271438CCE6}" type="datetimeFigureOut">
               <a:rPr lang="en-US" smtClean="0"/>
-              <a:t>11/11/18</a:t>
+              <a:t>11/19/18</a:t>
             </a:fld>
             <a:endParaRPr lang="en-US"/>
           </a:p>
@@ -2353,7 +2353,7 @@
           <a:p>
             <a:fld id="{25EC0CD3-564D-9742-98B5-86271438CCE6}" type="datetimeFigureOut">
               <a:rPr lang="en-US" smtClean="0"/>
-              <a:t>11/11/18</a:t>
+              <a:t>11/19/18</a:t>
             </a:fld>
             <a:endParaRPr lang="en-US"/>
           </a:p>
@@ -2566,7 +2566,7 @@
           <a:p>
             <a:fld id="{25EC0CD3-564D-9742-98B5-86271438CCE6}" type="datetimeFigureOut">
               <a:rPr lang="en-US" smtClean="0"/>
-              <a:t>11/11/18</a:t>
+              <a:t>11/19/18</a:t>
             </a:fld>
             <a:endParaRPr lang="en-US"/>
           </a:p>
@@ -2973,36 +2973,6 @@
       </p:grpSpPr>
       <p:pic>
         <p:nvPicPr>
-          <p:cNvPr id="15" name="Picture 14">
-            <a:extLst>
-              <a:ext uri="{FF2B5EF4-FFF2-40B4-BE49-F238E27FC236}">
-                <a16:creationId xmlns:a16="http://schemas.microsoft.com/office/drawing/2014/main" id="{BE74302C-7EBA-2E40-A1AA-0F9A4242535C}"/>
-              </a:ext>
-            </a:extLst>
-          </p:cNvPr>
-          <p:cNvPicPr>
-            <a:picLocks noChangeAspect="1"/>
-          </p:cNvPicPr>
-          <p:nvPr/>
-        </p:nvPicPr>
-        <p:blipFill>
-          <a:blip r:embed="rId2"/>
-          <a:stretch>
-            <a:fillRect/>
-          </a:stretch>
-        </p:blipFill>
-        <p:spPr>
-          <a:xfrm>
-            <a:off x="747346" y="6188457"/>
-            <a:ext cx="8654582" cy="2088471"/>
-          </a:xfrm>
-          <a:prstGeom prst="rect">
-            <a:avLst/>
-          </a:prstGeom>
-        </p:spPr>
-      </p:pic>
-      <p:pic>
-        <p:nvPicPr>
           <p:cNvPr id="7" name="Picture 6">
             <a:extLst>
               <a:ext uri="{FF2B5EF4-FFF2-40B4-BE49-F238E27FC236}">
@@ -3016,7 +2986,7 @@
           <p:nvPr/>
         </p:nvPicPr>
         <p:blipFill>
-          <a:blip r:embed="rId3"/>
+          <a:blip r:embed="rId2"/>
           <a:stretch>
             <a:fillRect/>
           </a:stretch>
@@ -3046,7 +3016,7 @@
           <p:nvPr/>
         </p:nvPicPr>
         <p:blipFill>
-          <a:blip r:embed="rId4"/>
+          <a:blip r:embed="rId3"/>
           <a:stretch>
             <a:fillRect/>
           </a:stretch>
@@ -3169,6 +3139,36 @@
           </a:p>
         </p:txBody>
       </p:sp>
+      <p:pic>
+        <p:nvPicPr>
+          <p:cNvPr id="4" name="Picture 3">
+            <a:extLst>
+              <a:ext uri="{FF2B5EF4-FFF2-40B4-BE49-F238E27FC236}">
+                <a16:creationId xmlns:a16="http://schemas.microsoft.com/office/drawing/2014/main" id="{5ABA0810-FBEF-1D4E-870B-63A8F6DB2FB4}"/>
+              </a:ext>
+            </a:extLst>
+          </p:cNvPr>
+          <p:cNvPicPr>
+            <a:picLocks noChangeAspect="1"/>
+          </p:cNvPicPr>
+          <p:nvPr/>
+        </p:nvPicPr>
+        <p:blipFill>
+          <a:blip r:embed="rId4"/>
+          <a:stretch>
+            <a:fillRect/>
+          </a:stretch>
+        </p:blipFill>
+        <p:spPr>
+          <a:xfrm>
+            <a:off x="713893" y="6210759"/>
+            <a:ext cx="8778515" cy="2052260"/>
+          </a:xfrm>
+          <a:prstGeom prst="rect">
+            <a:avLst/>
+          </a:prstGeom>
+        </p:spPr>
+      </p:pic>
     </p:spTree>
     <p:extLst>
       <p:ext uri="{BB962C8B-B14F-4D97-AF65-F5344CB8AC3E}">

</xml_diff>